<commit_message>
update presentation & add examples
</commit_message>
<xml_diff>
--- a/team9-multithreading/Поддержка Параллелизма в Java.pptx
+++ b/team9-multithreading/Поддержка Параллелизма в Java.pptx
@@ -231,7 +231,7 @@
           <a:p>
             <a:fld id="{DA513904-EE2D-4627-8FB5-DF1637D077C2}" type="datetimeFigureOut">
               <a:rPr lang="ru-RU" smtClean="0"/>
-              <a:t>11.10.2025</a:t>
+              <a:t>13.10.2025</a:t>
             </a:fld>
             <a:endParaRPr lang="ru-RU"/>
           </a:p>
@@ -745,7 +745,7 @@
           <a:p>
             <a:fld id="{E7BCD936-F841-4ECB-BAC6-46B7AA5F9CBE}" type="datetimeFigureOut">
               <a:rPr lang="ru-RU" smtClean="0"/>
-              <a:t>11.10.2025</a:t>
+              <a:t>13.10.2025</a:t>
             </a:fld>
             <a:endParaRPr lang="ru-RU"/>
           </a:p>
@@ -915,7 +915,7 @@
           <a:p>
             <a:fld id="{E7BCD936-F841-4ECB-BAC6-46B7AA5F9CBE}" type="datetimeFigureOut">
               <a:rPr lang="ru-RU" smtClean="0"/>
-              <a:t>11.10.2025</a:t>
+              <a:t>13.10.2025</a:t>
             </a:fld>
             <a:endParaRPr lang="ru-RU"/>
           </a:p>
@@ -1095,7 +1095,7 @@
           <a:p>
             <a:fld id="{E7BCD936-F841-4ECB-BAC6-46B7AA5F9CBE}" type="datetimeFigureOut">
               <a:rPr lang="ru-RU" smtClean="0"/>
-              <a:t>11.10.2025</a:t>
+              <a:t>13.10.2025</a:t>
             </a:fld>
             <a:endParaRPr lang="ru-RU"/>
           </a:p>
@@ -1265,7 +1265,7 @@
           <a:p>
             <a:fld id="{E7BCD936-F841-4ECB-BAC6-46B7AA5F9CBE}" type="datetimeFigureOut">
               <a:rPr lang="ru-RU" smtClean="0"/>
-              <a:t>11.10.2025</a:t>
+              <a:t>13.10.2025</a:t>
             </a:fld>
             <a:endParaRPr lang="ru-RU"/>
           </a:p>
@@ -1533,7 +1533,7 @@
           <a:p>
             <a:fld id="{E7BCD936-F841-4ECB-BAC6-46B7AA5F9CBE}" type="datetimeFigureOut">
               <a:rPr lang="ru-RU" smtClean="0"/>
-              <a:t>11.10.2025</a:t>
+              <a:t>13.10.2025</a:t>
             </a:fld>
             <a:endParaRPr lang="ru-RU"/>
           </a:p>
@@ -1765,7 +1765,7 @@
           <a:p>
             <a:fld id="{E7BCD936-F841-4ECB-BAC6-46B7AA5F9CBE}" type="datetimeFigureOut">
               <a:rPr lang="ru-RU" smtClean="0"/>
-              <a:t>11.10.2025</a:t>
+              <a:t>13.10.2025</a:t>
             </a:fld>
             <a:endParaRPr lang="ru-RU"/>
           </a:p>
@@ -2124,7 +2124,7 @@
           <a:p>
             <a:fld id="{E7BCD936-F841-4ECB-BAC6-46B7AA5F9CBE}" type="datetimeFigureOut">
               <a:rPr lang="ru-RU" smtClean="0"/>
-              <a:t>11.10.2025</a:t>
+              <a:t>13.10.2025</a:t>
             </a:fld>
             <a:endParaRPr lang="ru-RU"/>
           </a:p>
@@ -2265,7 +2265,7 @@
           <a:p>
             <a:fld id="{E7BCD936-F841-4ECB-BAC6-46B7AA5F9CBE}" type="datetimeFigureOut">
               <a:rPr lang="ru-RU" smtClean="0"/>
-              <a:t>11.10.2025</a:t>
+              <a:t>13.10.2025</a:t>
             </a:fld>
             <a:endParaRPr lang="ru-RU"/>
           </a:p>
@@ -2360,7 +2360,7 @@
           <a:p>
             <a:fld id="{E7BCD936-F841-4ECB-BAC6-46B7AA5F9CBE}" type="datetimeFigureOut">
               <a:rPr lang="ru-RU" smtClean="0"/>
-              <a:t>11.10.2025</a:t>
+              <a:t>13.10.2025</a:t>
             </a:fld>
             <a:endParaRPr lang="ru-RU"/>
           </a:p>
@@ -2717,7 +2717,7 @@
           <a:p>
             <a:fld id="{E7BCD936-F841-4ECB-BAC6-46B7AA5F9CBE}" type="datetimeFigureOut">
               <a:rPr lang="ru-RU" smtClean="0"/>
-              <a:t>11.10.2025</a:t>
+              <a:t>13.10.2025</a:t>
             </a:fld>
             <a:endParaRPr lang="ru-RU"/>
           </a:p>
@@ -3074,7 +3074,7 @@
           <a:p>
             <a:fld id="{E7BCD936-F841-4ECB-BAC6-46B7AA5F9CBE}" type="datetimeFigureOut">
               <a:rPr lang="ru-RU" smtClean="0"/>
-              <a:t>11.10.2025</a:t>
+              <a:t>13.10.2025</a:t>
             </a:fld>
             <a:endParaRPr lang="ru-RU"/>
           </a:p>
@@ -3316,7 +3316,7 @@
           <a:p>
             <a:fld id="{E7BCD936-F841-4ECB-BAC6-46B7AA5F9CBE}" type="datetimeFigureOut">
               <a:rPr lang="ru-RU" smtClean="0"/>
-              <a:t>11.10.2025</a:t>
+              <a:t>13.10.2025</a:t>
             </a:fld>
             <a:endParaRPr lang="ru-RU"/>
           </a:p>
@@ -4253,7 +4253,7 @@
         </p:nvSpPr>
         <p:spPr>
           <a:xfrm>
-            <a:off x="695657" y="6280850"/>
+            <a:off x="605603" y="6280850"/>
             <a:ext cx="6096000" cy="369332"/>
           </a:xfrm>
           <a:prstGeom prst="rect">
@@ -12997,38 +12997,6 @@
                 <a:ea typeface="Calibri" panose="020F0502020204030204" pitchFamily="34" charset="0"/>
                 <a:cs typeface="Calibri" panose="020F0502020204030204" pitchFamily="34" charset="0"/>
               </a:rPr>
-              <a:t>Что такое</a:t>
-            </a:r>
-            <a:r>
-              <a:rPr lang="en-US" sz="1600" dirty="0">
-                <a:latin typeface="Calibri" panose="020F0502020204030204" pitchFamily="34" charset="0"/>
-                <a:ea typeface="Calibri" panose="020F0502020204030204" pitchFamily="34" charset="0"/>
-                <a:cs typeface="Calibri" panose="020F0502020204030204" pitchFamily="34" charset="0"/>
-              </a:rPr>
-              <a:t> </a:t>
-            </a:r>
-            <a:r>
-              <a:rPr lang="en-US" sz="1600" dirty="0" err="1">
-                <a:latin typeface="Calibri" panose="020F0502020204030204" pitchFamily="34" charset="0"/>
-                <a:ea typeface="Calibri" panose="020F0502020204030204" pitchFamily="34" charset="0"/>
-                <a:cs typeface="Calibri" panose="020F0502020204030204" pitchFamily="34" charset="0"/>
-              </a:rPr>
-              <a:t>ConcurrentHashMap</a:t>
-            </a:r>
-            <a:r>
-              <a:rPr lang="en-US" sz="1600" dirty="0">
-                <a:latin typeface="Calibri" panose="020F0502020204030204" pitchFamily="34" charset="0"/>
-                <a:ea typeface="Calibri" panose="020F0502020204030204" pitchFamily="34" charset="0"/>
-                <a:cs typeface="Calibri" panose="020F0502020204030204" pitchFamily="34" charset="0"/>
-              </a:rPr>
-              <a:t>? </a:t>
-            </a:r>
-            <a:r>
-              <a:rPr lang="ru-RU" sz="1600" dirty="0">
-                <a:latin typeface="Calibri" panose="020F0502020204030204" pitchFamily="34" charset="0"/>
-                <a:ea typeface="Calibri" panose="020F0502020204030204" pitchFamily="34" charset="0"/>
-                <a:cs typeface="Calibri" panose="020F0502020204030204" pitchFamily="34" charset="0"/>
-              </a:rPr>
               <a:t>Это </a:t>
             </a:r>
             <a:r>
@@ -13127,7 +13095,7 @@
                 <a:ea typeface="Calibri" panose="020F0502020204030204" pitchFamily="34" charset="0"/>
                 <a:cs typeface="Calibri" panose="020F0502020204030204" pitchFamily="34" charset="0"/>
               </a:rPr>
-              <a:t>Если у вас есть многозадачная программа, где несколько потоков должны читать и изменять карту (например, кеш или конфигурацию),</a:t>
+              <a:t>Если у вас есть многозадачная программа, где несколько потоков должны читать и изменять мапу (например, кеш или конфигурацию),</a:t>
             </a:r>
             <a:r>
               <a:rPr lang="en-US" sz="1600" dirty="0">
@@ -13277,7 +13245,7 @@
         </p:nvSpPr>
         <p:spPr bwMode="auto">
           <a:xfrm>
-            <a:off x="2433320" y="2864846"/>
+            <a:off x="2433320" y="2712446"/>
             <a:ext cx="7325360" cy="1569660"/>
           </a:xfrm>
           <a:prstGeom prst="rect">

</xml_diff>